<commit_message>
Update cto summit slides
</commit_message>
<xml_diff>
--- a/sts/cto_summit_11_2012/selectiverecall.pptx
+++ b/sts/cto_summit_11_2012/selectiverecall.pptx
@@ -216,7 +216,7 @@
           <a:p>
             <a:fld id="{147FF762-1AFA-0E4E-9746-07A1AAD6D49D}" type="datetimeFigureOut">
               <a:rPr lang="en-US" smtClean="0"/>
-              <a:t>11/12/12</a:t>
+              <a:t>5/13/13</a:t>
             </a:fld>
             <a:endParaRPr lang="en-US"/>
           </a:p>
@@ -1466,7 +1466,7 @@
           <a:p>
             <a:fld id="{70FAA508-F0CD-46EA-95FB-26B559A0B5D9}" type="datetimeFigureOut">
               <a:rPr lang="en-US" smtClean="0"/>
-              <a:t>11/12/12</a:t>
+              <a:t>5/13/13</a:t>
             </a:fld>
             <a:endParaRPr lang="en-US"/>
           </a:p>
@@ -1787,7 +1787,7 @@
           <a:p>
             <a:fld id="{70FAA508-F0CD-46EA-95FB-26B559A0B5D9}" type="datetimeFigureOut">
               <a:rPr lang="en-US" smtClean="0"/>
-              <a:t>11/12/12</a:t>
+              <a:t>5/13/13</a:t>
             </a:fld>
             <a:endParaRPr lang="en-US"/>
           </a:p>
@@ -2064,7 +2064,7 @@
           <a:p>
             <a:fld id="{70FAA508-F0CD-46EA-95FB-26B559A0B5D9}" type="datetimeFigureOut">
               <a:rPr lang="en-US" smtClean="0"/>
-              <a:t>11/12/12</a:t>
+              <a:t>5/13/13</a:t>
             </a:fld>
             <a:endParaRPr lang="en-US"/>
           </a:p>
@@ -2358,7 +2358,7 @@
           <a:p>
             <a:fld id="{70FAA508-F0CD-46EA-95FB-26B559A0B5D9}" type="datetimeFigureOut">
               <a:rPr lang="en-US" smtClean="0"/>
-              <a:t>11/12/12</a:t>
+              <a:t>5/13/13</a:t>
             </a:fld>
             <a:endParaRPr lang="en-US"/>
           </a:p>
@@ -2687,7 +2687,7 @@
           <a:p>
             <a:fld id="{70FAA508-F0CD-46EA-95FB-26B559A0B5D9}" type="datetimeFigureOut">
               <a:rPr lang="en-US" smtClean="0"/>
-              <a:t>11/12/12</a:t>
+              <a:t>5/13/13</a:t>
             </a:fld>
             <a:endParaRPr lang="en-US"/>
           </a:p>
@@ -2938,7 +2938,7 @@
           <a:p>
             <a:fld id="{70FAA508-F0CD-46EA-95FB-26B559A0B5D9}" type="datetimeFigureOut">
               <a:rPr lang="en-US" smtClean="0"/>
-              <a:t>11/12/12</a:t>
+              <a:t>5/13/13</a:t>
             </a:fld>
             <a:endParaRPr lang="en-US"/>
           </a:p>
@@ -3117,7 +3117,7 @@
           <a:p>
             <a:fld id="{70FAA508-F0CD-46EA-95FB-26B559A0B5D9}" type="datetimeFigureOut">
               <a:rPr lang="en-US" smtClean="0"/>
-              <a:t>11/12/12</a:t>
+              <a:t>5/13/13</a:t>
             </a:fld>
             <a:endParaRPr lang="en-US"/>
           </a:p>
@@ -3286,7 +3286,7 @@
           <a:p>
             <a:fld id="{70FAA508-F0CD-46EA-95FB-26B559A0B5D9}" type="datetimeFigureOut">
               <a:rPr lang="en-US" smtClean="0"/>
-              <a:t>11/12/12</a:t>
+              <a:t>5/13/13</a:t>
             </a:fld>
             <a:endParaRPr lang="en-US"/>
           </a:p>
@@ -3555,7 +3555,7 @@
           <a:p>
             <a:fld id="{70FAA508-F0CD-46EA-95FB-26B559A0B5D9}" type="datetimeFigureOut">
               <a:rPr lang="en-US" smtClean="0"/>
-              <a:t>11/12/12</a:t>
+              <a:t>5/13/13</a:t>
             </a:fld>
             <a:endParaRPr lang="en-US"/>
           </a:p>
@@ -3862,7 +3862,7 @@
           <a:p>
             <a:fld id="{70FAA508-F0CD-46EA-95FB-26B559A0B5D9}" type="datetimeFigureOut">
               <a:rPr lang="en-US" smtClean="0"/>
-              <a:t>11/12/12</a:t>
+              <a:t>5/13/13</a:t>
             </a:fld>
             <a:endParaRPr lang="en-US"/>
           </a:p>
@@ -4154,7 +4154,7 @@
           <a:p>
             <a:fld id="{70FAA508-F0CD-46EA-95FB-26B559A0B5D9}" type="datetimeFigureOut">
               <a:rPr lang="en-US" smtClean="0"/>
-              <a:t>11/12/12</a:t>
+              <a:t>5/13/13</a:t>
             </a:fld>
             <a:endParaRPr lang="en-US"/>
           </a:p>
@@ -4584,7 +4584,7 @@
           <a:p>
             <a:fld id="{70FAA508-F0CD-46EA-95FB-26B559A0B5D9}" type="datetimeFigureOut">
               <a:rPr lang="en-US" smtClean="0"/>
-              <a:t>11/12/12</a:t>
+              <a:t>5/13/13</a:t>
             </a:fld>
             <a:endParaRPr lang="en-US"/>
           </a:p>
@@ -4930,7 +4930,7 @@
           <a:p>
             <a:fld id="{70FAA508-F0CD-46EA-95FB-26B559A0B5D9}" type="datetimeFigureOut">
               <a:rPr lang="en-US" smtClean="0"/>
-              <a:t>11/12/12</a:t>
+              <a:t>5/13/13</a:t>
             </a:fld>
             <a:endParaRPr lang="en-US"/>
           </a:p>
@@ -5020,7 +5020,7 @@
           <a:p>
             <a:fld id="{70FAA508-F0CD-46EA-95FB-26B559A0B5D9}" type="datetimeFigureOut">
               <a:rPr lang="en-US" smtClean="0"/>
-              <a:t>11/12/12</a:t>
+              <a:t>5/13/13</a:t>
             </a:fld>
             <a:endParaRPr lang="en-US"/>
           </a:p>
@@ -5357,7 +5357,7 @@
           <a:p>
             <a:fld id="{70FAA508-F0CD-46EA-95FB-26B559A0B5D9}" type="datetimeFigureOut">
               <a:rPr lang="en-US" smtClean="0"/>
-              <a:t>11/12/12</a:t>
+              <a:t>5/13/13</a:t>
             </a:fld>
             <a:endParaRPr lang="en-US"/>
           </a:p>
@@ -5569,7 +5569,7 @@
           <a:p>
             <a:fld id="{70FAA508-F0CD-46EA-95FB-26B559A0B5D9}" type="datetimeFigureOut">
               <a:rPr lang="en-US" smtClean="0"/>
-              <a:t>11/12/12</a:t>
+              <a:t>5/13/13</a:t>
             </a:fld>
             <a:endParaRPr lang="en-US"/>
           </a:p>
@@ -23834,11 +23834,7 @@
           <a:p>
             <a:r>
               <a:rPr lang="en-US" sz="2800" dirty="0" smtClean="0"/>
-              <a:t>Goal: automatically diagnose network </a:t>
-            </a:r>
-            <a:r>
-              <a:rPr lang="en-US" sz="2800" dirty="0" smtClean="0"/>
-              <a:t>policy violations</a:t>
+              <a:t>Goal: automatically diagnose network policy violations</a:t>
             </a:r>
             <a:endParaRPr lang="en-US" sz="2800" dirty="0"/>
           </a:p>
@@ -24508,29 +24504,13 @@
           <a:p>
             <a:r>
               <a:rPr lang="en-US" sz="3600" dirty="0" smtClean="0"/>
-              <a:t>Problem in policy? </a:t>
-            </a:r>
+              <a:t>Problem in policy?     Change it</a:t>
+            </a:r>
+          </a:p>
+          <a:p>
             <a:r>
               <a:rPr lang="en-US" sz="3600" dirty="0" smtClean="0"/>
-              <a:t>    Change </a:t>
-            </a:r>
-            <a:r>
-              <a:rPr lang="en-US" sz="3600" dirty="0" smtClean="0"/>
-              <a:t>it</a:t>
-            </a:r>
-          </a:p>
-          <a:p>
-            <a:r>
-              <a:rPr lang="en-US" sz="3600" dirty="0" smtClean="0"/>
-              <a:t>Problem in network hardware? </a:t>
-            </a:r>
-            <a:r>
-              <a:rPr lang="en-US" sz="3600" dirty="0" smtClean="0"/>
-              <a:t>     	Call </a:t>
-            </a:r>
-            <a:r>
-              <a:rPr lang="en-US" sz="3600" dirty="0" smtClean="0"/>
-              <a:t>up vendor</a:t>
+              <a:t>Problem in network hardware?      	Call up vendor</a:t>
             </a:r>
           </a:p>
           <a:p>
@@ -28927,7 +28907,7 @@
           <a:graphicData uri="http://schemas.openxmlformats.org/presentationml/2006/ole">
             <mc:AlternateContent xmlns:mc="http://schemas.openxmlformats.org/markup-compatibility/2006">
               <mc:Choice xmlns:v="urn:schemas-microsoft-com:vml" Requires="v">
-                <p:oleObj spid="_x0000_s8219" name="Equation" r:id="rId3" imgW="12179300" imgH="4051300" progId="Equation.3">
+                <p:oleObj spid="_x0000_s8221" name="Equation" r:id="rId3" imgW="12179300" imgH="4051300" progId="Equation.3">
                   <p:embed/>
                 </p:oleObj>
               </mc:Choice>

</xml_diff>